<commit_message>
Edit to plot exports
Increased font size on many plots
</commit_message>
<xml_diff>
--- a/significance_results/article_figures/figures.pptx
+++ b/significance_results/article_figures/figures.pptx
@@ -8,9 +8,12 @@
     <p:sldId id="256" r:id="rId2"/>
     <p:sldId id="257" r:id="rId3"/>
     <p:sldId id="258" r:id="rId4"/>
-    <p:sldId id="259" r:id="rId5"/>
-    <p:sldId id="260" r:id="rId6"/>
-    <p:sldId id="261" r:id="rId7"/>
+    <p:sldId id="262" r:id="rId5"/>
+    <p:sldId id="259" r:id="rId6"/>
+    <p:sldId id="260" r:id="rId7"/>
+    <p:sldId id="261" r:id="rId8"/>
+    <p:sldId id="263" r:id="rId9"/>
+    <p:sldId id="264" r:id="rId10"/>
   </p:sldIdLst>
   <p:sldSz cx="12192000" cy="15544800"/>
   <p:notesSz cx="6858000" cy="9144000"/>
@@ -248,7 +251,7 @@
           <a:p>
             <a:fld id="{4435414B-ADD2-43DE-9D73-0125DC6028B1}" type="datetimeFigureOut">
               <a:rPr lang="en-US" smtClean="0"/>
-              <a:t>9/27/2022</a:t>
+              <a:t>11/10/2022</a:t>
             </a:fld>
             <a:endParaRPr lang="en-US"/>
           </a:p>
@@ -418,7 +421,7 @@
           <a:p>
             <a:fld id="{4435414B-ADD2-43DE-9D73-0125DC6028B1}" type="datetimeFigureOut">
               <a:rPr lang="en-US" smtClean="0"/>
-              <a:t>9/27/2022</a:t>
+              <a:t>11/10/2022</a:t>
             </a:fld>
             <a:endParaRPr lang="en-US"/>
           </a:p>
@@ -598,7 +601,7 @@
           <a:p>
             <a:fld id="{4435414B-ADD2-43DE-9D73-0125DC6028B1}" type="datetimeFigureOut">
               <a:rPr lang="en-US" smtClean="0"/>
-              <a:t>9/27/2022</a:t>
+              <a:t>11/10/2022</a:t>
             </a:fld>
             <a:endParaRPr lang="en-US"/>
           </a:p>
@@ -768,7 +771,7 @@
           <a:p>
             <a:fld id="{4435414B-ADD2-43DE-9D73-0125DC6028B1}" type="datetimeFigureOut">
               <a:rPr lang="en-US" smtClean="0"/>
-              <a:t>9/27/2022</a:t>
+              <a:t>11/10/2022</a:t>
             </a:fld>
             <a:endParaRPr lang="en-US"/>
           </a:p>
@@ -1012,7 +1015,7 @@
           <a:p>
             <a:fld id="{4435414B-ADD2-43DE-9D73-0125DC6028B1}" type="datetimeFigureOut">
               <a:rPr lang="en-US" smtClean="0"/>
-              <a:t>9/27/2022</a:t>
+              <a:t>11/10/2022</a:t>
             </a:fld>
             <a:endParaRPr lang="en-US"/>
           </a:p>
@@ -1244,7 +1247,7 @@
           <a:p>
             <a:fld id="{4435414B-ADD2-43DE-9D73-0125DC6028B1}" type="datetimeFigureOut">
               <a:rPr lang="en-US" smtClean="0"/>
-              <a:t>9/27/2022</a:t>
+              <a:t>11/10/2022</a:t>
             </a:fld>
             <a:endParaRPr lang="en-US"/>
           </a:p>
@@ -1611,7 +1614,7 @@
           <a:p>
             <a:fld id="{4435414B-ADD2-43DE-9D73-0125DC6028B1}" type="datetimeFigureOut">
               <a:rPr lang="en-US" smtClean="0"/>
-              <a:t>9/27/2022</a:t>
+              <a:t>11/10/2022</a:t>
             </a:fld>
             <a:endParaRPr lang="en-US"/>
           </a:p>
@@ -1729,7 +1732,7 @@
           <a:p>
             <a:fld id="{4435414B-ADD2-43DE-9D73-0125DC6028B1}" type="datetimeFigureOut">
               <a:rPr lang="en-US" smtClean="0"/>
-              <a:t>9/27/2022</a:t>
+              <a:t>11/10/2022</a:t>
             </a:fld>
             <a:endParaRPr lang="en-US"/>
           </a:p>
@@ -1824,7 +1827,7 @@
           <a:p>
             <a:fld id="{4435414B-ADD2-43DE-9D73-0125DC6028B1}" type="datetimeFigureOut">
               <a:rPr lang="en-US" smtClean="0"/>
-              <a:t>9/27/2022</a:t>
+              <a:t>11/10/2022</a:t>
             </a:fld>
             <a:endParaRPr lang="en-US"/>
           </a:p>
@@ -2101,7 +2104,7 @@
           <a:p>
             <a:fld id="{4435414B-ADD2-43DE-9D73-0125DC6028B1}" type="datetimeFigureOut">
               <a:rPr lang="en-US" smtClean="0"/>
-              <a:t>9/27/2022</a:t>
+              <a:t>11/10/2022</a:t>
             </a:fld>
             <a:endParaRPr lang="en-US"/>
           </a:p>
@@ -2358,7 +2361,7 @@
           <a:p>
             <a:fld id="{4435414B-ADD2-43DE-9D73-0125DC6028B1}" type="datetimeFigureOut">
               <a:rPr lang="en-US" smtClean="0"/>
-              <a:t>9/27/2022</a:t>
+              <a:t>11/10/2022</a:t>
             </a:fld>
             <a:endParaRPr lang="en-US"/>
           </a:p>
@@ -2571,7 +2574,7 @@
           <a:p>
             <a:fld id="{4435414B-ADD2-43DE-9D73-0125DC6028B1}" type="datetimeFigureOut">
               <a:rPr lang="en-US" smtClean="0"/>
-              <a:t>9/27/2022</a:t>
+              <a:t>11/10/2022</a:t>
             </a:fld>
             <a:endParaRPr lang="en-US"/>
           </a:p>
@@ -3582,6 +3585,128 @@
           <a:chExt cx="0" cy="0"/>
         </a:xfrm>
       </p:grpSpPr>
+      <p:grpSp>
+        <p:nvGrpSpPr>
+          <p:cNvPr id="13" name="Group 12">
+            <a:extLst>
+              <a:ext uri="{FF2B5EF4-FFF2-40B4-BE49-F238E27FC236}">
+                <a16:creationId xmlns:a16="http://schemas.microsoft.com/office/drawing/2014/main" id="{0AA6D186-45B9-B688-7D78-BBBAA1416285}"/>
+              </a:ext>
+            </a:extLst>
+          </p:cNvPr>
+          <p:cNvGrpSpPr/>
+          <p:nvPr/>
+        </p:nvGrpSpPr>
+        <p:grpSpPr>
+          <a:xfrm>
+            <a:off x="0" y="5286458"/>
+            <a:ext cx="12658503" cy="4971884"/>
+            <a:chOff x="0" y="5250289"/>
+            <a:chExt cx="11174799" cy="4389129"/>
+          </a:xfrm>
+        </p:grpSpPr>
+        <p:pic>
+          <p:nvPicPr>
+            <p:cNvPr id="10" name="Picture 9">
+              <a:extLst>
+                <a:ext uri="{FF2B5EF4-FFF2-40B4-BE49-F238E27FC236}">
+                  <a16:creationId xmlns:a16="http://schemas.microsoft.com/office/drawing/2014/main" id="{E24D0AE4-02CA-108E-706B-40826670BDD1}"/>
+                </a:ext>
+              </a:extLst>
+            </p:cNvPr>
+            <p:cNvPicPr>
+              <a:picLocks noChangeAspect="1"/>
+            </p:cNvPicPr>
+            <p:nvPr/>
+          </p:nvPicPr>
+          <p:blipFill rotWithShape="1">
+            <a:blip r:embed="rId2">
+              <a:extLst>
+                <a:ext uri="{28A0092B-C50C-407E-A947-70E740481C1C}">
+                  <a14:useLocalDpi xmlns:a14="http://schemas.microsoft.com/office/drawing/2010/main" val="0"/>
+                </a:ext>
+              </a:extLst>
+            </a:blip>
+            <a:srcRect r="9048"/>
+            <a:stretch/>
+          </p:blipFill>
+          <p:spPr>
+            <a:xfrm>
+              <a:off x="0" y="5250289"/>
+              <a:ext cx="5322627" cy="4389129"/>
+            </a:xfrm>
+            <a:prstGeom prst="rect">
+              <a:avLst/>
+            </a:prstGeom>
+          </p:spPr>
+        </p:pic>
+        <p:pic>
+          <p:nvPicPr>
+            <p:cNvPr id="12" name="Picture 11">
+              <a:extLst>
+                <a:ext uri="{FF2B5EF4-FFF2-40B4-BE49-F238E27FC236}">
+                  <a16:creationId xmlns:a16="http://schemas.microsoft.com/office/drawing/2014/main" id="{697949BC-01DA-EF8A-6FF5-D97FA90E8197}"/>
+                </a:ext>
+              </a:extLst>
+            </p:cNvPr>
+            <p:cNvPicPr>
+              <a:picLocks noChangeAspect="1"/>
+            </p:cNvPicPr>
+            <p:nvPr/>
+          </p:nvPicPr>
+          <p:blipFill>
+            <a:blip r:embed="rId3">
+              <a:extLst>
+                <a:ext uri="{28A0092B-C50C-407E-A947-70E740481C1C}">
+                  <a14:useLocalDpi xmlns:a14="http://schemas.microsoft.com/office/drawing/2010/main" val="0"/>
+                </a:ext>
+              </a:extLst>
+            </a:blip>
+            <a:stretch>
+              <a:fillRect/>
+            </a:stretch>
+          </p:blipFill>
+          <p:spPr>
+            <a:xfrm>
+              <a:off x="5322627" y="5250289"/>
+              <a:ext cx="5852172" cy="4389129"/>
+            </a:xfrm>
+            <a:prstGeom prst="rect">
+              <a:avLst/>
+            </a:prstGeom>
+          </p:spPr>
+        </p:pic>
+      </p:grpSp>
+    </p:spTree>
+    <p:extLst>
+      <p:ext uri="{BB962C8B-B14F-4D97-AF65-F5344CB8AC3E}">
+        <p14:creationId xmlns:p14="http://schemas.microsoft.com/office/powerpoint/2010/main" val="280392009"/>
+      </p:ext>
+    </p:extLst>
+  </p:cSld>
+  <p:clrMapOvr>
+    <a:masterClrMapping/>
+  </p:clrMapOvr>
+</p:sld>
+</file>
+
+<file path=ppt/slides/slide5.xml><?xml version="1.0" encoding="utf-8"?>
+<p:sld xmlns:a="http://schemas.openxmlformats.org/drawingml/2006/main" xmlns:r="http://schemas.openxmlformats.org/officeDocument/2006/relationships" xmlns:p="http://schemas.openxmlformats.org/presentationml/2006/main">
+  <p:cSld>
+    <p:spTree>
+      <p:nvGrpSpPr>
+        <p:cNvPr id="1" name=""/>
+        <p:cNvGrpSpPr/>
+        <p:nvPr/>
+      </p:nvGrpSpPr>
+      <p:grpSpPr>
+        <a:xfrm>
+          <a:off x="0" y="0"/>
+          <a:ext cx="0" cy="0"/>
+          <a:chOff x="0" y="0"/>
+          <a:chExt cx="0" cy="0"/>
+        </a:xfrm>
+      </p:grpSpPr>
       <p:sp>
         <p:nvSpPr>
           <p:cNvPr id="12" name="TextBox 11">
@@ -3727,7 +3852,7 @@
 </p:sld>
 </file>
 
-<file path=ppt/slides/slide5.xml><?xml version="1.0" encoding="utf-8"?>
+<file path=ppt/slides/slide6.xml><?xml version="1.0" encoding="utf-8"?>
 <p:sld xmlns:a="http://schemas.openxmlformats.org/drawingml/2006/main" xmlns:r="http://schemas.openxmlformats.org/officeDocument/2006/relationships" xmlns:p="http://schemas.openxmlformats.org/presentationml/2006/main">
   <p:cSld>
     <p:spTree>
@@ -4009,7 +4134,7 @@
 </p:sld>
 </file>
 
-<file path=ppt/slides/slide6.xml><?xml version="1.0" encoding="utf-8"?>
+<file path=ppt/slides/slide7.xml><?xml version="1.0" encoding="utf-8"?>
 <p:sld xmlns:a="http://schemas.openxmlformats.org/drawingml/2006/main" xmlns:r="http://schemas.openxmlformats.org/officeDocument/2006/relationships" xmlns:p="http://schemas.openxmlformats.org/presentationml/2006/main">
   <p:cSld>
     <p:spTree>
@@ -4100,6 +4225,452 @@
     <p:extLst>
       <p:ext uri="{BB962C8B-B14F-4D97-AF65-F5344CB8AC3E}">
         <p14:creationId xmlns:p14="http://schemas.microsoft.com/office/powerpoint/2010/main" val="2940556912"/>
+      </p:ext>
+    </p:extLst>
+  </p:cSld>
+  <p:clrMapOvr>
+    <a:masterClrMapping/>
+  </p:clrMapOvr>
+</p:sld>
+</file>
+
+<file path=ppt/slides/slide8.xml><?xml version="1.0" encoding="utf-8"?>
+<p:sld xmlns:a="http://schemas.openxmlformats.org/drawingml/2006/main" xmlns:r="http://schemas.openxmlformats.org/officeDocument/2006/relationships" xmlns:p="http://schemas.openxmlformats.org/presentationml/2006/main">
+  <p:cSld>
+    <p:spTree>
+      <p:nvGrpSpPr>
+        <p:cNvPr id="1" name=""/>
+        <p:cNvGrpSpPr/>
+        <p:nvPr/>
+      </p:nvGrpSpPr>
+      <p:grpSpPr>
+        <a:xfrm>
+          <a:off x="0" y="0"/>
+          <a:ext cx="0" cy="0"/>
+          <a:chOff x="0" y="0"/>
+          <a:chExt cx="0" cy="0"/>
+        </a:xfrm>
+      </p:grpSpPr>
+      <p:grpSp>
+        <p:nvGrpSpPr>
+          <p:cNvPr id="19" name="Group 18">
+            <a:extLst>
+              <a:ext uri="{FF2B5EF4-FFF2-40B4-BE49-F238E27FC236}">
+                <a16:creationId xmlns:a16="http://schemas.microsoft.com/office/drawing/2014/main" id="{6CDF8E59-2A2C-F33C-3C2B-FC7905089758}"/>
+              </a:ext>
+            </a:extLst>
+          </p:cNvPr>
+          <p:cNvGrpSpPr/>
+          <p:nvPr/>
+        </p:nvGrpSpPr>
+        <p:grpSpPr>
+          <a:xfrm>
+            <a:off x="1167657" y="1336330"/>
+            <a:ext cx="9856686" cy="7349163"/>
+            <a:chOff x="295610" y="2698786"/>
+            <a:chExt cx="9856686" cy="7349163"/>
+          </a:xfrm>
+        </p:grpSpPr>
+        <p:grpSp>
+          <p:nvGrpSpPr>
+            <p:cNvPr id="16" name="Group 15">
+              <a:extLst>
+                <a:ext uri="{FF2B5EF4-FFF2-40B4-BE49-F238E27FC236}">
+                  <a16:creationId xmlns:a16="http://schemas.microsoft.com/office/drawing/2014/main" id="{DB4DAFC1-836D-8BAD-22E1-76D3F17D3A16}"/>
+                </a:ext>
+              </a:extLst>
+            </p:cNvPr>
+            <p:cNvGrpSpPr/>
+            <p:nvPr/>
+          </p:nvGrpSpPr>
+          <p:grpSpPr>
+            <a:xfrm>
+              <a:off x="295610" y="2698786"/>
+              <a:ext cx="9253183" cy="7349163"/>
+              <a:chOff x="2142698" y="4809992"/>
+              <a:chExt cx="9253183" cy="7349163"/>
+            </a:xfrm>
+          </p:grpSpPr>
+          <p:pic>
+            <p:nvPicPr>
+              <p:cNvPr id="7" name="Picture 6" descr="Chart&#10;&#10;Description automatically generated">
+                <a:extLst>
+                  <a:ext uri="{FF2B5EF4-FFF2-40B4-BE49-F238E27FC236}">
+                    <a16:creationId xmlns:a16="http://schemas.microsoft.com/office/drawing/2014/main" id="{B5B7741E-F3BA-FDFA-54D6-A3C0EF1CAD9C}"/>
+                  </a:ext>
+                </a:extLst>
+              </p:cNvPr>
+              <p:cNvPicPr>
+                <a:picLocks noChangeAspect="1"/>
+              </p:cNvPicPr>
+              <p:nvPr/>
+            </p:nvPicPr>
+            <p:blipFill rotWithShape="1">
+              <a:blip r:embed="rId2">
+                <a:extLst>
+                  <a:ext uri="{28A0092B-C50C-407E-A947-70E740481C1C}">
+                    <a14:useLocalDpi xmlns:a14="http://schemas.microsoft.com/office/drawing/2010/main" val="0"/>
+                  </a:ext>
+                </a:extLst>
+              </a:blip>
+              <a:srcRect l="1921" t="13309" r="19256" b="9266"/>
+              <a:stretch/>
+            </p:blipFill>
+            <p:spPr>
+              <a:xfrm>
+                <a:off x="2142698" y="5179325"/>
+                <a:ext cx="4612943" cy="3398293"/>
+              </a:xfrm>
+              <a:prstGeom prst="rect">
+                <a:avLst/>
+              </a:prstGeom>
+            </p:spPr>
+          </p:pic>
+          <p:pic>
+            <p:nvPicPr>
+              <p:cNvPr id="9" name="Picture 8" descr="Chart&#10;&#10;Description automatically generated">
+                <a:extLst>
+                  <a:ext uri="{FF2B5EF4-FFF2-40B4-BE49-F238E27FC236}">
+                    <a16:creationId xmlns:a16="http://schemas.microsoft.com/office/drawing/2014/main" id="{ADC6C42D-0EEC-1802-79C1-3E2B9BED3397}"/>
+                  </a:ext>
+                </a:extLst>
+              </p:cNvPr>
+              <p:cNvPicPr>
+                <a:picLocks noChangeAspect="1"/>
+              </p:cNvPicPr>
+              <p:nvPr/>
+            </p:nvPicPr>
+            <p:blipFill rotWithShape="1">
+              <a:blip r:embed="rId3">
+                <a:extLst>
+                  <a:ext uri="{28A0092B-C50C-407E-A947-70E740481C1C}">
+                    <a14:useLocalDpi xmlns:a14="http://schemas.microsoft.com/office/drawing/2010/main" val="0"/>
+                  </a:ext>
+                </a:extLst>
+              </a:blip>
+              <a:srcRect l="2036" t="13309" r="19140" b="9266"/>
+              <a:stretch/>
+            </p:blipFill>
+            <p:spPr>
+              <a:xfrm>
+                <a:off x="6769289" y="5179324"/>
+                <a:ext cx="4612943" cy="3398293"/>
+              </a:xfrm>
+              <a:prstGeom prst="rect">
+                <a:avLst/>
+              </a:prstGeom>
+            </p:spPr>
+          </p:pic>
+          <p:sp>
+            <p:nvSpPr>
+              <p:cNvPr id="10" name="TextBox 9">
+                <a:extLst>
+                  <a:ext uri="{FF2B5EF4-FFF2-40B4-BE49-F238E27FC236}">
+                    <a16:creationId xmlns:a16="http://schemas.microsoft.com/office/drawing/2014/main" id="{80F7CDFC-09E1-AE15-F8D5-DCD4EE66134F}"/>
+                  </a:ext>
+                </a:extLst>
+              </p:cNvPr>
+              <p:cNvSpPr txBox="1"/>
+              <p:nvPr/>
+            </p:nvSpPr>
+            <p:spPr>
+              <a:xfrm>
+                <a:off x="5422712" y="4809992"/>
+                <a:ext cx="3204950" cy="369332"/>
+              </a:xfrm>
+              <a:prstGeom prst="rect">
+                <a:avLst/>
+              </a:prstGeom>
+              <a:noFill/>
+            </p:spPr>
+            <p:txBody>
+              <a:bodyPr wrap="square" rtlCol="0">
+                <a:spAutoFit/>
+              </a:bodyPr>
+              <a:lstStyle/>
+              <a:p>
+                <a:r>
+                  <a:rPr lang="en-US" dirty="0">
+                    <a:latin typeface="DejaVu Sans" panose="020B0603030804020204" pitchFamily="34" charset="0"/>
+                    <a:ea typeface="DejaVu Sans" panose="020B0603030804020204" pitchFamily="34" charset="0"/>
+                    <a:cs typeface="DejaVu Sans" panose="020B0603030804020204" pitchFamily="34" charset="0"/>
+                  </a:rPr>
+                  <a:t>Water supply reliability</a:t>
+                </a:r>
+              </a:p>
+            </p:txBody>
+          </p:sp>
+          <p:pic>
+            <p:nvPicPr>
+              <p:cNvPr id="12" name="Picture 11" descr="Chart&#10;&#10;Description automatically generated">
+                <a:extLst>
+                  <a:ext uri="{FF2B5EF4-FFF2-40B4-BE49-F238E27FC236}">
+                    <a16:creationId xmlns:a16="http://schemas.microsoft.com/office/drawing/2014/main" id="{458A7A6F-10E9-6E69-7B3E-45D37FB7365A}"/>
+                  </a:ext>
+                </a:extLst>
+              </p:cNvPr>
+              <p:cNvPicPr>
+                <a:picLocks noChangeAspect="1"/>
+              </p:cNvPicPr>
+              <p:nvPr/>
+            </p:nvPicPr>
+            <p:blipFill rotWithShape="1">
+              <a:blip r:embed="rId4">
+                <a:extLst>
+                  <a:ext uri="{28A0092B-C50C-407E-A947-70E740481C1C}">
+                    <a14:useLocalDpi xmlns:a14="http://schemas.microsoft.com/office/drawing/2010/main" val="0"/>
+                  </a:ext>
+                </a:extLst>
+              </a:blip>
+              <a:srcRect l="2321" t="12708" r="18855" b="9866"/>
+              <a:stretch/>
+            </p:blipFill>
+            <p:spPr>
+              <a:xfrm>
+                <a:off x="2142698" y="8750808"/>
+                <a:ext cx="4626591" cy="3408347"/>
+              </a:xfrm>
+              <a:prstGeom prst="rect">
+                <a:avLst/>
+              </a:prstGeom>
+            </p:spPr>
+          </p:pic>
+          <p:pic>
+            <p:nvPicPr>
+              <p:cNvPr id="14" name="Picture 13" descr="Chart&#10;&#10;Description automatically generated">
+                <a:extLst>
+                  <a:ext uri="{FF2B5EF4-FFF2-40B4-BE49-F238E27FC236}">
+                    <a16:creationId xmlns:a16="http://schemas.microsoft.com/office/drawing/2014/main" id="{45C81A86-B09D-86AF-A5E5-6888E18DD6F3}"/>
+                  </a:ext>
+                </a:extLst>
+              </p:cNvPr>
+              <p:cNvPicPr>
+                <a:picLocks noChangeAspect="1"/>
+              </p:cNvPicPr>
+              <p:nvPr/>
+            </p:nvPicPr>
+            <p:blipFill rotWithShape="1">
+              <a:blip r:embed="rId5">
+                <a:extLst>
+                  <a:ext uri="{28A0092B-C50C-407E-A947-70E740481C1C}">
+                    <a14:useLocalDpi xmlns:a14="http://schemas.microsoft.com/office/drawing/2010/main" val="0"/>
+                  </a:ext>
+                </a:extLst>
+              </a:blip>
+              <a:srcRect l="1880" t="12500" r="19062" b="9254"/>
+              <a:stretch/>
+            </p:blipFill>
+            <p:spPr>
+              <a:xfrm>
+                <a:off x="6769289" y="8724830"/>
+                <a:ext cx="4626592" cy="3434325"/>
+              </a:xfrm>
+              <a:prstGeom prst="rect">
+                <a:avLst/>
+              </a:prstGeom>
+            </p:spPr>
+          </p:pic>
+          <p:sp>
+            <p:nvSpPr>
+              <p:cNvPr id="15" name="TextBox 14">
+                <a:extLst>
+                  <a:ext uri="{FF2B5EF4-FFF2-40B4-BE49-F238E27FC236}">
+                    <a16:creationId xmlns:a16="http://schemas.microsoft.com/office/drawing/2014/main" id="{2733F72D-1650-8FC6-CCE7-B2E6306A4168}"/>
+                  </a:ext>
+                </a:extLst>
+              </p:cNvPr>
+              <p:cNvSpPr txBox="1"/>
+              <p:nvPr/>
+            </p:nvSpPr>
+            <p:spPr>
+              <a:xfrm>
+                <a:off x="5584055" y="8422168"/>
+                <a:ext cx="2882264" cy="369332"/>
+              </a:xfrm>
+              <a:prstGeom prst="rect">
+                <a:avLst/>
+              </a:prstGeom>
+              <a:noFill/>
+            </p:spPr>
+            <p:txBody>
+              <a:bodyPr wrap="none" rtlCol="0">
+                <a:spAutoFit/>
+              </a:bodyPr>
+              <a:lstStyle/>
+              <a:p>
+                <a:r>
+                  <a:rPr lang="en-US" dirty="0">
+                    <a:latin typeface="DejaVu Sans" panose="020B0603030804020204" pitchFamily="34" charset="0"/>
+                    <a:ea typeface="DejaVu Sans" panose="020B0603030804020204" pitchFamily="34" charset="0"/>
+                    <a:cs typeface="DejaVu Sans" panose="020B0603030804020204" pitchFamily="34" charset="0"/>
+                  </a:rPr>
+                  <a:t>Upstream flood volume</a:t>
+                </a:r>
+              </a:p>
+            </p:txBody>
+          </p:sp>
+        </p:grpSp>
+        <p:pic>
+          <p:nvPicPr>
+            <p:cNvPr id="18" name="Picture 17" descr="Chart&#10;&#10;Description automatically generated">
+              <a:extLst>
+                <a:ext uri="{FF2B5EF4-FFF2-40B4-BE49-F238E27FC236}">
+                  <a16:creationId xmlns:a16="http://schemas.microsoft.com/office/drawing/2014/main" id="{48CC874A-EF9F-2E63-4113-18388C6D2097}"/>
+                </a:ext>
+              </a:extLst>
+            </p:cNvPr>
+            <p:cNvPicPr>
+              <a:picLocks noChangeAspect="1"/>
+            </p:cNvPicPr>
+            <p:nvPr/>
+          </p:nvPicPr>
+          <p:blipFill rotWithShape="1">
+            <a:blip r:embed="rId5">
+              <a:extLst>
+                <a:ext uri="{28A0092B-C50C-407E-A947-70E740481C1C}">
+                  <a14:useLocalDpi xmlns:a14="http://schemas.microsoft.com/office/drawing/2010/main" val="0"/>
+                </a:ext>
+              </a:extLst>
+            </a:blip>
+            <a:srcRect l="83646" r="6042"/>
+            <a:stretch/>
+          </p:blipFill>
+          <p:spPr>
+            <a:xfrm>
+              <a:off x="9548792" y="4301063"/>
+              <a:ext cx="603504" cy="4389129"/>
+            </a:xfrm>
+            <a:prstGeom prst="rect">
+              <a:avLst/>
+            </a:prstGeom>
+          </p:spPr>
+        </p:pic>
+      </p:grpSp>
+    </p:spTree>
+    <p:extLst>
+      <p:ext uri="{BB962C8B-B14F-4D97-AF65-F5344CB8AC3E}">
+        <p14:creationId xmlns:p14="http://schemas.microsoft.com/office/powerpoint/2010/main" val="3743905771"/>
+      </p:ext>
+    </p:extLst>
+  </p:cSld>
+  <p:clrMapOvr>
+    <a:masterClrMapping/>
+  </p:clrMapOvr>
+</p:sld>
+</file>
+
+<file path=ppt/slides/slide9.xml><?xml version="1.0" encoding="utf-8"?>
+<p:sld xmlns:a="http://schemas.openxmlformats.org/drawingml/2006/main" xmlns:r="http://schemas.openxmlformats.org/officeDocument/2006/relationships" xmlns:p="http://schemas.openxmlformats.org/presentationml/2006/main">
+  <p:cSld>
+    <p:spTree>
+      <p:nvGrpSpPr>
+        <p:cNvPr id="1" name=""/>
+        <p:cNvGrpSpPr/>
+        <p:nvPr/>
+      </p:nvGrpSpPr>
+      <p:grpSpPr>
+        <a:xfrm>
+          <a:off x="0" y="0"/>
+          <a:ext cx="0" cy="0"/>
+          <a:chOff x="0" y="0"/>
+          <a:chExt cx="0" cy="0"/>
+        </a:xfrm>
+      </p:grpSpPr>
+      <p:grpSp>
+        <p:nvGrpSpPr>
+          <p:cNvPr id="8" name="Group 7">
+            <a:extLst>
+              <a:ext uri="{FF2B5EF4-FFF2-40B4-BE49-F238E27FC236}">
+                <a16:creationId xmlns:a16="http://schemas.microsoft.com/office/drawing/2014/main" id="{EA35FF9A-3C0E-CB9F-4439-10789C885FFF}"/>
+              </a:ext>
+            </a:extLst>
+          </p:cNvPr>
+          <p:cNvGrpSpPr/>
+          <p:nvPr/>
+        </p:nvGrpSpPr>
+        <p:grpSpPr>
+          <a:xfrm>
+            <a:off x="2315184" y="583660"/>
+            <a:ext cx="7078503" cy="8589526"/>
+            <a:chOff x="1926077" y="1546698"/>
+            <a:chExt cx="7078503" cy="8589526"/>
+          </a:xfrm>
+        </p:grpSpPr>
+        <p:pic>
+          <p:nvPicPr>
+            <p:cNvPr id="5" name="Picture 4" descr="Chart, line chart&#10;&#10;Description automatically generated">
+              <a:extLst>
+                <a:ext uri="{FF2B5EF4-FFF2-40B4-BE49-F238E27FC236}">
+                  <a16:creationId xmlns:a16="http://schemas.microsoft.com/office/drawing/2014/main" id="{CFBF782F-8C3C-DE88-CE73-2A6128A1E364}"/>
+                </a:ext>
+              </a:extLst>
+            </p:cNvPr>
+            <p:cNvPicPr>
+              <a:picLocks noChangeAspect="1"/>
+            </p:cNvPicPr>
+            <p:nvPr/>
+          </p:nvPicPr>
+          <p:blipFill rotWithShape="1">
+            <a:blip r:embed="rId2">
+              <a:extLst>
+                <a:ext uri="{28A0092B-C50C-407E-A947-70E740481C1C}">
+                  <a14:useLocalDpi xmlns:a14="http://schemas.microsoft.com/office/drawing/2010/main" val="0"/>
+                </a:ext>
+              </a:extLst>
+            </a:blip>
+            <a:srcRect l="2171" t="1490" r="1064" b="9362"/>
+            <a:stretch/>
+          </p:blipFill>
+          <p:spPr>
+            <a:xfrm>
+              <a:off x="1926077" y="1546698"/>
+              <a:ext cx="7078502" cy="4075890"/>
+            </a:xfrm>
+            <a:prstGeom prst="rect">
+              <a:avLst/>
+            </a:prstGeom>
+          </p:spPr>
+        </p:pic>
+        <p:pic>
+          <p:nvPicPr>
+            <p:cNvPr id="7" name="Picture 6" descr="Chart, line chart&#10;&#10;Description automatically generated">
+              <a:extLst>
+                <a:ext uri="{FF2B5EF4-FFF2-40B4-BE49-F238E27FC236}">
+                  <a16:creationId xmlns:a16="http://schemas.microsoft.com/office/drawing/2014/main" id="{604BCC4C-1D37-5006-DAE2-6761757D59F3}"/>
+                </a:ext>
+              </a:extLst>
+            </p:cNvPr>
+            <p:cNvPicPr>
+              <a:picLocks noChangeAspect="1"/>
+            </p:cNvPicPr>
+            <p:nvPr/>
+          </p:nvPicPr>
+          <p:blipFill rotWithShape="1">
+            <a:blip r:embed="rId3">
+              <a:extLst>
+                <a:ext uri="{28A0092B-C50C-407E-A947-70E740481C1C}">
+                  <a14:useLocalDpi xmlns:a14="http://schemas.microsoft.com/office/drawing/2010/main" val="0"/>
+                </a:ext>
+              </a:extLst>
+            </a:blip>
+            <a:srcRect l="2171" t="1915" r="1064"/>
+            <a:stretch/>
+          </p:blipFill>
+          <p:spPr>
+            <a:xfrm>
+              <a:off x="1926077" y="5651769"/>
+              <a:ext cx="7078503" cy="4484455"/>
+            </a:xfrm>
+            <a:prstGeom prst="rect">
+              <a:avLst/>
+            </a:prstGeom>
+          </p:spPr>
+        </p:pic>
+      </p:grpSp>
+    </p:spTree>
+    <p:extLst>
+      <p:ext uri="{BB962C8B-B14F-4D97-AF65-F5344CB8AC3E}">
+        <p14:creationId xmlns:p14="http://schemas.microsoft.com/office/powerpoint/2010/main" val="171685331"/>
       </p:ext>
     </p:extLst>
   </p:cSld>

</xml_diff>